<commit_message>
https://jira.hl7.org/browse/FHIR-49216 - Corrected prefix application in modular diagram
</commit_message>
<xml_diff>
--- a/input/images-source/modular.pptx
+++ b/input/images-source/modular.pptx
@@ -104,6 +104,11 @@
       </a:defRPr>
     </a:lvl9pPr>
   </p:defaultTextStyle>
+  <p:extLst>
+    <p:ext uri="{EFAFB233-063F-42B5-8137-9DF3F51BA10A}">
+      <p15:sldGuideLst xmlns:p15="http://schemas.microsoft.com/office/powerpoint/2012/main"/>
+    </p:ext>
+  </p:extLst>
 </p:presentation>
 </file>
 
@@ -254,7 +259,7 @@
           <a:p>
             <a:fld id="{353330BC-A51B-45A2-9745-2486C347E3DF}" type="datetimeFigureOut">
               <a:rPr lang="en-US" smtClean="0"/>
-              <a:t>11/7/2021</a:t>
+              <a:t>8/6/2025</a:t>
             </a:fld>
             <a:endParaRPr lang="en-US"/>
           </a:p>
@@ -452,7 +457,7 @@
           <a:p>
             <a:fld id="{353330BC-A51B-45A2-9745-2486C347E3DF}" type="datetimeFigureOut">
               <a:rPr lang="en-US" smtClean="0"/>
-              <a:t>11/7/2021</a:t>
+              <a:t>8/6/2025</a:t>
             </a:fld>
             <a:endParaRPr lang="en-US"/>
           </a:p>
@@ -660,7 +665,7 @@
           <a:p>
             <a:fld id="{353330BC-A51B-45A2-9745-2486C347E3DF}" type="datetimeFigureOut">
               <a:rPr lang="en-US" smtClean="0"/>
-              <a:t>11/7/2021</a:t>
+              <a:t>8/6/2025</a:t>
             </a:fld>
             <a:endParaRPr lang="en-US"/>
           </a:p>
@@ -858,7 +863,7 @@
           <a:p>
             <a:fld id="{353330BC-A51B-45A2-9745-2486C347E3DF}" type="datetimeFigureOut">
               <a:rPr lang="en-US" smtClean="0"/>
-              <a:t>11/7/2021</a:t>
+              <a:t>8/6/2025</a:t>
             </a:fld>
             <a:endParaRPr lang="en-US"/>
           </a:p>
@@ -1133,7 +1138,7 @@
           <a:p>
             <a:fld id="{353330BC-A51B-45A2-9745-2486C347E3DF}" type="datetimeFigureOut">
               <a:rPr lang="en-US" smtClean="0"/>
-              <a:t>11/7/2021</a:t>
+              <a:t>8/6/2025</a:t>
             </a:fld>
             <a:endParaRPr lang="en-US"/>
           </a:p>
@@ -1398,7 +1403,7 @@
           <a:p>
             <a:fld id="{353330BC-A51B-45A2-9745-2486C347E3DF}" type="datetimeFigureOut">
               <a:rPr lang="en-US" smtClean="0"/>
-              <a:t>11/7/2021</a:t>
+              <a:t>8/6/2025</a:t>
             </a:fld>
             <a:endParaRPr lang="en-US"/>
           </a:p>
@@ -1810,7 +1815,7 @@
           <a:p>
             <a:fld id="{353330BC-A51B-45A2-9745-2486C347E3DF}" type="datetimeFigureOut">
               <a:rPr lang="en-US" smtClean="0"/>
-              <a:t>11/7/2021</a:t>
+              <a:t>8/6/2025</a:t>
             </a:fld>
             <a:endParaRPr lang="en-US"/>
           </a:p>
@@ -1951,7 +1956,7 @@
           <a:p>
             <a:fld id="{353330BC-A51B-45A2-9745-2486C347E3DF}" type="datetimeFigureOut">
               <a:rPr lang="en-US" smtClean="0"/>
-              <a:t>11/7/2021</a:t>
+              <a:t>8/6/2025</a:t>
             </a:fld>
             <a:endParaRPr lang="en-US"/>
           </a:p>
@@ -2064,7 +2069,7 @@
           <a:p>
             <a:fld id="{353330BC-A51B-45A2-9745-2486C347E3DF}" type="datetimeFigureOut">
               <a:rPr lang="en-US" smtClean="0"/>
-              <a:t>11/7/2021</a:t>
+              <a:t>8/6/2025</a:t>
             </a:fld>
             <a:endParaRPr lang="en-US"/>
           </a:p>
@@ -2375,7 +2380,7 @@
           <a:p>
             <a:fld id="{353330BC-A51B-45A2-9745-2486C347E3DF}" type="datetimeFigureOut">
               <a:rPr lang="en-US" smtClean="0"/>
-              <a:t>11/7/2021</a:t>
+              <a:t>8/6/2025</a:t>
             </a:fld>
             <a:endParaRPr lang="en-US"/>
           </a:p>
@@ -2663,7 +2668,7 @@
           <a:p>
             <a:fld id="{353330BC-A51B-45A2-9745-2486C347E3DF}" type="datetimeFigureOut">
               <a:rPr lang="en-US" smtClean="0"/>
-              <a:t>11/7/2021</a:t>
+              <a:t>8/6/2025</a:t>
             </a:fld>
             <a:endParaRPr lang="en-US"/>
           </a:p>
@@ -2904,7 +2909,7 @@
           <a:p>
             <a:fld id="{353330BC-A51B-45A2-9745-2486C347E3DF}" type="datetimeFigureOut">
               <a:rPr lang="en-US" smtClean="0"/>
-              <a:t>11/7/2021</a:t>
+              <a:t>8/6/2025</a:t>
             </a:fld>
             <a:endParaRPr lang="en-US"/>
           </a:p>
@@ -3805,7 +3810,7 @@
               <a:p>
                 <a:r>
                   <a:rPr lang="en-US" sz="1200" dirty="0"/>
-                  <a:t>ItemA-1</a:t>
+                  <a:t>AItem1</a:t>
                 </a:r>
               </a:p>
               <a:p>
@@ -3873,7 +3878,7 @@
               <a:p>
                 <a:r>
                   <a:rPr lang="en-US" sz="1200" dirty="0"/>
-                  <a:t>ItemA-2</a:t>
+                  <a:t>AItem2</a:t>
                 </a:r>
               </a:p>
               <a:p>
@@ -3941,7 +3946,7 @@
               <a:p>
                 <a:r>
                   <a:rPr lang="en-US" sz="1200" dirty="0"/>
-                  <a:t>ItemB-1</a:t>
+                  <a:t>BItem1</a:t>
                 </a:r>
               </a:p>
               <a:p>
@@ -4009,7 +4014,7 @@
               <a:p>
                 <a:r>
                   <a:rPr lang="en-US" sz="1200" dirty="0"/>
-                  <a:t>ItemB-2</a:t>
+                  <a:t>BItem2</a:t>
                 </a:r>
               </a:p>
               <a:p>

</xml_diff>